<commit_message>
1. Fix for #381 - completed workflow diagram.
</commit_message>
<xml_diff>
--- a/resources/gettingStarted/installation_data_flowchart.pptx
+++ b/resources/gettingStarted/installation_data_flowchart.pptx
@@ -289,7 +289,7 @@
             <a:fld id="{90F34A1F-72DA-4C40-AA21-704C75E38360}" type="datetimeFigureOut">
               <a:rPr lang="en-US" smtClean="0"/>
               <a:pPr/>
-              <a:t>9/26/11</a:t>
+              <a:t>9/27/11</a:t>
             </a:fld>
             <a:endParaRPr lang="en-US"/>
           </a:p>
@@ -456,7 +456,7 @@
             <a:fld id="{90F34A1F-72DA-4C40-AA21-704C75E38360}" type="datetimeFigureOut">
               <a:rPr lang="en-US" smtClean="0"/>
               <a:pPr/>
-              <a:t>9/26/11</a:t>
+              <a:t>9/27/11</a:t>
             </a:fld>
             <a:endParaRPr lang="en-US"/>
           </a:p>
@@ -633,7 +633,7 @@
             <a:fld id="{90F34A1F-72DA-4C40-AA21-704C75E38360}" type="datetimeFigureOut">
               <a:rPr lang="en-US" smtClean="0"/>
               <a:pPr/>
-              <a:t>9/26/11</a:t>
+              <a:t>9/27/11</a:t>
             </a:fld>
             <a:endParaRPr lang="en-US"/>
           </a:p>
@@ -800,7 +800,7 @@
             <a:fld id="{90F34A1F-72DA-4C40-AA21-704C75E38360}" type="datetimeFigureOut">
               <a:rPr lang="en-US" smtClean="0"/>
               <a:pPr/>
-              <a:t>9/26/11</a:t>
+              <a:t>9/27/11</a:t>
             </a:fld>
             <a:endParaRPr lang="en-US"/>
           </a:p>
@@ -1043,7 +1043,7 @@
             <a:fld id="{90F34A1F-72DA-4C40-AA21-704C75E38360}" type="datetimeFigureOut">
               <a:rPr lang="en-US" smtClean="0"/>
               <a:pPr/>
-              <a:t>9/26/11</a:t>
+              <a:t>9/27/11</a:t>
             </a:fld>
             <a:endParaRPr lang="en-US"/>
           </a:p>
@@ -1328,7 +1328,7 @@
             <a:fld id="{90F34A1F-72DA-4C40-AA21-704C75E38360}" type="datetimeFigureOut">
               <a:rPr lang="en-US" smtClean="0"/>
               <a:pPr/>
-              <a:t>9/26/11</a:t>
+              <a:t>9/27/11</a:t>
             </a:fld>
             <a:endParaRPr lang="en-US"/>
           </a:p>
@@ -1747,7 +1747,7 @@
             <a:fld id="{90F34A1F-72DA-4C40-AA21-704C75E38360}" type="datetimeFigureOut">
               <a:rPr lang="en-US" smtClean="0"/>
               <a:pPr/>
-              <a:t>9/26/11</a:t>
+              <a:t>9/27/11</a:t>
             </a:fld>
             <a:endParaRPr lang="en-US"/>
           </a:p>
@@ -1862,7 +1862,7 @@
             <a:fld id="{90F34A1F-72DA-4C40-AA21-704C75E38360}" type="datetimeFigureOut">
               <a:rPr lang="en-US" smtClean="0"/>
               <a:pPr/>
-              <a:t>9/26/11</a:t>
+              <a:t>9/27/11</a:t>
             </a:fld>
             <a:endParaRPr lang="en-US"/>
           </a:p>
@@ -1954,7 +1954,7 @@
             <a:fld id="{90F34A1F-72DA-4C40-AA21-704C75E38360}" type="datetimeFigureOut">
               <a:rPr lang="en-US" smtClean="0"/>
               <a:pPr/>
-              <a:t>9/26/11</a:t>
+              <a:t>9/27/11</a:t>
             </a:fld>
             <a:endParaRPr lang="en-US"/>
           </a:p>
@@ -2228,7 +2228,7 @@
             <a:fld id="{90F34A1F-72DA-4C40-AA21-704C75E38360}" type="datetimeFigureOut">
               <a:rPr lang="en-US" smtClean="0"/>
               <a:pPr/>
-              <a:t>9/26/11</a:t>
+              <a:t>9/27/11</a:t>
             </a:fld>
             <a:endParaRPr lang="en-US"/>
           </a:p>
@@ -2478,7 +2478,7 @@
             <a:fld id="{90F34A1F-72DA-4C40-AA21-704C75E38360}" type="datetimeFigureOut">
               <a:rPr lang="en-US" smtClean="0"/>
               <a:pPr/>
-              <a:t>9/26/11</a:t>
+              <a:t>9/27/11</a:t>
             </a:fld>
             <a:endParaRPr lang="en-US"/>
           </a:p>
@@ -2688,7 +2688,7 @@
             <a:fld id="{90F34A1F-72DA-4C40-AA21-704C75E38360}" type="datetimeFigureOut">
               <a:rPr lang="en-US" smtClean="0"/>
               <a:pPr/>
-              <a:t>9/26/11</a:t>
+              <a:t>9/27/11</a:t>
             </a:fld>
             <a:endParaRPr lang="en-US"/>
           </a:p>
@@ -4011,6 +4011,13 @@
   <p:clrMapOvr>
     <a:masterClrMapping/>
   </p:clrMapOvr>
+  <p:timing>
+    <p:tnLst>
+      <p:par>
+        <p:cTn id="1" dur="indefinite" restart="never" nodeType="tmRoot"/>
+      </p:par>
+    </p:tnLst>
+  </p:timing>
 </p:sld>
 </file>
 

</xml_diff>